<commit_message>
fu git changed intro and put in Serge's comments
</commit_message>
<xml_diff>
--- a/paper/expfig.pptx
+++ b/paper/expfig.pptx
@@ -288,7 +288,7 @@
           <a:p>
             <a:fld id="{7CBF8EF0-AF56-4E85-86F3-FE68B944A49F}" type="datetimeFigureOut">
               <a:rPr lang="en-US" smtClean="0"/>
-              <a:t>1/29/2011</a:t>
+              <a:t>1/31/2011</a:t>
             </a:fld>
             <a:endParaRPr lang="en-US"/>
           </a:p>
@@ -458,7 +458,7 @@
           <a:p>
             <a:fld id="{7CBF8EF0-AF56-4E85-86F3-FE68B944A49F}" type="datetimeFigureOut">
               <a:rPr lang="en-US" smtClean="0"/>
-              <a:t>1/29/2011</a:t>
+              <a:t>1/31/2011</a:t>
             </a:fld>
             <a:endParaRPr lang="en-US"/>
           </a:p>
@@ -638,7 +638,7 @@
           <a:p>
             <a:fld id="{7CBF8EF0-AF56-4E85-86F3-FE68B944A49F}" type="datetimeFigureOut">
               <a:rPr lang="en-US" smtClean="0"/>
-              <a:t>1/29/2011</a:t>
+              <a:t>1/31/2011</a:t>
             </a:fld>
             <a:endParaRPr lang="en-US"/>
           </a:p>
@@ -808,7 +808,7 @@
           <a:p>
             <a:fld id="{7CBF8EF0-AF56-4E85-86F3-FE68B944A49F}" type="datetimeFigureOut">
               <a:rPr lang="en-US" smtClean="0"/>
-              <a:t>1/29/2011</a:t>
+              <a:t>1/31/2011</a:t>
             </a:fld>
             <a:endParaRPr lang="en-US"/>
           </a:p>
@@ -1054,7 +1054,7 @@
           <a:p>
             <a:fld id="{7CBF8EF0-AF56-4E85-86F3-FE68B944A49F}" type="datetimeFigureOut">
               <a:rPr lang="en-US" smtClean="0"/>
-              <a:t>1/29/2011</a:t>
+              <a:t>1/31/2011</a:t>
             </a:fld>
             <a:endParaRPr lang="en-US"/>
           </a:p>
@@ -1342,7 +1342,7 @@
           <a:p>
             <a:fld id="{7CBF8EF0-AF56-4E85-86F3-FE68B944A49F}" type="datetimeFigureOut">
               <a:rPr lang="en-US" smtClean="0"/>
-              <a:t>1/29/2011</a:t>
+              <a:t>1/31/2011</a:t>
             </a:fld>
             <a:endParaRPr lang="en-US"/>
           </a:p>
@@ -1764,7 +1764,7 @@
           <a:p>
             <a:fld id="{7CBF8EF0-AF56-4E85-86F3-FE68B944A49F}" type="datetimeFigureOut">
               <a:rPr lang="en-US" smtClean="0"/>
-              <a:t>1/29/2011</a:t>
+              <a:t>1/31/2011</a:t>
             </a:fld>
             <a:endParaRPr lang="en-US"/>
           </a:p>
@@ -1882,7 +1882,7 @@
           <a:p>
             <a:fld id="{7CBF8EF0-AF56-4E85-86F3-FE68B944A49F}" type="datetimeFigureOut">
               <a:rPr lang="en-US" smtClean="0"/>
-              <a:t>1/29/2011</a:t>
+              <a:t>1/31/2011</a:t>
             </a:fld>
             <a:endParaRPr lang="en-US"/>
           </a:p>
@@ -1977,7 +1977,7 @@
           <a:p>
             <a:fld id="{7CBF8EF0-AF56-4E85-86F3-FE68B944A49F}" type="datetimeFigureOut">
               <a:rPr lang="en-US" smtClean="0"/>
-              <a:t>1/29/2011</a:t>
+              <a:t>1/31/2011</a:t>
             </a:fld>
             <a:endParaRPr lang="en-US"/>
           </a:p>
@@ -2254,7 +2254,7 @@
           <a:p>
             <a:fld id="{7CBF8EF0-AF56-4E85-86F3-FE68B944A49F}" type="datetimeFigureOut">
               <a:rPr lang="en-US" smtClean="0"/>
-              <a:t>1/29/2011</a:t>
+              <a:t>1/31/2011</a:t>
             </a:fld>
             <a:endParaRPr lang="en-US"/>
           </a:p>
@@ -2507,7 +2507,7 @@
           <a:p>
             <a:fld id="{7CBF8EF0-AF56-4E85-86F3-FE68B944A49F}" type="datetimeFigureOut">
               <a:rPr lang="en-US" smtClean="0"/>
-              <a:t>1/29/2011</a:t>
+              <a:t>1/31/2011</a:t>
             </a:fld>
             <a:endParaRPr lang="en-US"/>
           </a:p>
@@ -2720,7 +2720,7 @@
           <a:p>
             <a:fld id="{7CBF8EF0-AF56-4E85-86F3-FE68B944A49F}" type="datetimeFigureOut">
               <a:rPr lang="en-US" smtClean="0"/>
-              <a:t>1/29/2011</a:t>
+              <a:t>1/31/2011</a:t>
             </a:fld>
             <a:endParaRPr lang="en-US"/>
           </a:p>
@@ -3205,7 +3205,7 @@
             <p:spPr>
               <a:xfrm>
                 <a:off x="1479190" y="357428"/>
-                <a:ext cx="324896" cy="307777"/>
+                <a:ext cx="328808" cy="307777"/>
               </a:xfrm>
               <a:prstGeom prst="rect">
                 <a:avLst/>
@@ -3218,6 +3218,7 @@
               </a:bodyPr>
               <a:lstStyle/>
               <a:p>
+                <a:pPr/>
                 <a14:m>
                   <m:oMathPara xmlns:m="http://schemas.openxmlformats.org/officeDocument/2006/math">
                     <m:oMathParaPr>
@@ -3228,7 +3229,7 @@
                         <a:rPr lang="en-US" sz="1400" b="0" i="1" smtClean="0">
                           <a:latin typeface="Cambria Math"/>
                         </a:rPr>
-                        <m:t>𝑏</m:t>
+                        <m:t>𝑦</m:t>
                       </m:r>
                     </m:oMath>
                   </m:oMathPara>
@@ -3250,7 +3251,7 @@
             <p:spPr>
               <a:xfrm>
                 <a:off x="1479190" y="357428"/>
-                <a:ext cx="324896" cy="307777"/>
+                <a:ext cx="328808" cy="307777"/>
               </a:xfrm>
               <a:prstGeom prst="rect">
                 <a:avLst/>
@@ -3258,7 +3259,7 @@
               <a:blipFill rotWithShape="1">
                 <a:blip r:embed="rId2"/>
                 <a:stretch>
-                  <a:fillRect/>
+                  <a:fillRect b="-2000"/>
                 </a:stretch>
               </a:blipFill>
             </p:spPr>
@@ -3349,6 +3350,7 @@
               </a:bodyPr>
               <a:lstStyle/>
               <a:p>
+                <a:pPr/>
                 <a14:m>
                   <m:oMathPara xmlns:m="http://schemas.openxmlformats.org/officeDocument/2006/math">
                     <m:oMathParaPr>
@@ -3359,7 +3361,7 @@
                         <a:rPr lang="en-US" sz="1400" b="0" i="1" smtClean="0">
                           <a:latin typeface="Cambria Math"/>
                         </a:rPr>
-                        <m:t>𝑎</m:t>
+                        <m:t>𝑥</m:t>
                       </m:r>
                     </m:oMath>
                   </m:oMathPara>
@@ -3456,8 +3458,8 @@
           </a:p>
         </p:txBody>
       </p:sp>
-      <mc:AlternateContent xmlns:mc="http://schemas.openxmlformats.org/markup-compatibility/2006">
-        <mc:Choice xmlns:a14="http://schemas.microsoft.com/office/drawing/2010/main" Requires="a14">
+      <mc:AlternateContent xmlns:mc="http://schemas.openxmlformats.org/markup-compatibility/2006" xmlns:a14="http://schemas.microsoft.com/office/drawing/2010/main">
+        <mc:Choice Requires="a14">
           <p:sp>
             <p:nvSpPr>
               <p:cNvPr id="10" name="TextBox 9"/>
@@ -3480,6 +3482,7 @@
               </a:bodyPr>
               <a:lstStyle/>
               <a:p>
+                <a:pPr/>
                 <a14:m>
                   <m:oMathPara xmlns:m="http://schemas.openxmlformats.org/officeDocument/2006/math">
                     <m:oMathParaPr>
@@ -3500,7 +3503,7 @@
             </p:txBody>
           </p:sp>
         </mc:Choice>
-        <mc:Fallback>
+        <mc:Fallback xmlns="">
           <p:sp>
             <p:nvSpPr>
               <p:cNvPr id="10" name="TextBox 9"/>
@@ -3587,8 +3590,8 @@
           </a:p>
         </p:txBody>
       </p:sp>
-      <mc:AlternateContent xmlns:mc="http://schemas.openxmlformats.org/markup-compatibility/2006">
-        <mc:Choice xmlns:a14="http://schemas.microsoft.com/office/drawing/2010/main" Requires="a14">
+      <mc:AlternateContent xmlns:mc="http://schemas.openxmlformats.org/markup-compatibility/2006" xmlns:a14="http://schemas.microsoft.com/office/drawing/2010/main">
+        <mc:Choice Requires="a14">
           <p:sp>
             <p:nvSpPr>
               <p:cNvPr id="12" name="TextBox 11"/>
@@ -3611,6 +3614,7 @@
               </a:bodyPr>
               <a:lstStyle/>
               <a:p>
+                <a:pPr/>
                 <a14:m>
                   <m:oMathPara xmlns:m="http://schemas.openxmlformats.org/officeDocument/2006/math">
                     <m:oMathParaPr>
@@ -3631,7 +3635,7 @@
             </p:txBody>
           </p:sp>
         </mc:Choice>
-        <mc:Fallback>
+        <mc:Fallback xmlns="">
           <p:sp>
             <p:nvSpPr>
               <p:cNvPr id="12" name="TextBox 11"/>

</xml_diff>